<commit_message>
Edited layout of main tabs. Added some images and added in some buttons
</commit_message>
<xml_diff>
--- a/Notes/Main Ribbon Structure.pptx
+++ b/Notes/Main Ribbon Structure.pptx
@@ -291,7 +291,7 @@
           <a:p>
             <a:fld id="{6929914E-8A27-4F46-9B95-82C92233D697}" type="datetimeFigureOut">
               <a:rPr lang="en-GB" smtClean="0"/>
-              <a:t>18/03/2014</a:t>
+              <a:t>18/07/2014</a:t>
             </a:fld>
             <a:endParaRPr lang="en-GB"/>
           </a:p>
@@ -461,7 +461,7 @@
           <a:p>
             <a:fld id="{6929914E-8A27-4F46-9B95-82C92233D697}" type="datetimeFigureOut">
               <a:rPr lang="en-GB" smtClean="0"/>
-              <a:t>18/03/2014</a:t>
+              <a:t>18/07/2014</a:t>
             </a:fld>
             <a:endParaRPr lang="en-GB"/>
           </a:p>
@@ -641,7 +641,7 @@
           <a:p>
             <a:fld id="{6929914E-8A27-4F46-9B95-82C92233D697}" type="datetimeFigureOut">
               <a:rPr lang="en-GB" smtClean="0"/>
-              <a:t>18/03/2014</a:t>
+              <a:t>18/07/2014</a:t>
             </a:fld>
             <a:endParaRPr lang="en-GB"/>
           </a:p>
@@ -811,7 +811,7 @@
           <a:p>
             <a:fld id="{6929914E-8A27-4F46-9B95-82C92233D697}" type="datetimeFigureOut">
               <a:rPr lang="en-GB" smtClean="0"/>
-              <a:t>18/03/2014</a:t>
+              <a:t>18/07/2014</a:t>
             </a:fld>
             <a:endParaRPr lang="en-GB"/>
           </a:p>
@@ -1057,7 +1057,7 @@
           <a:p>
             <a:fld id="{6929914E-8A27-4F46-9B95-82C92233D697}" type="datetimeFigureOut">
               <a:rPr lang="en-GB" smtClean="0"/>
-              <a:t>18/03/2014</a:t>
+              <a:t>18/07/2014</a:t>
             </a:fld>
             <a:endParaRPr lang="en-GB"/>
           </a:p>
@@ -1345,7 +1345,7 @@
           <a:p>
             <a:fld id="{6929914E-8A27-4F46-9B95-82C92233D697}" type="datetimeFigureOut">
               <a:rPr lang="en-GB" smtClean="0"/>
-              <a:t>18/03/2014</a:t>
+              <a:t>18/07/2014</a:t>
             </a:fld>
             <a:endParaRPr lang="en-GB"/>
           </a:p>
@@ -1767,7 +1767,7 @@
           <a:p>
             <a:fld id="{6929914E-8A27-4F46-9B95-82C92233D697}" type="datetimeFigureOut">
               <a:rPr lang="en-GB" smtClean="0"/>
-              <a:t>18/03/2014</a:t>
+              <a:t>18/07/2014</a:t>
             </a:fld>
             <a:endParaRPr lang="en-GB"/>
           </a:p>
@@ -1885,7 +1885,7 @@
           <a:p>
             <a:fld id="{6929914E-8A27-4F46-9B95-82C92233D697}" type="datetimeFigureOut">
               <a:rPr lang="en-GB" smtClean="0"/>
-              <a:t>18/03/2014</a:t>
+              <a:t>18/07/2014</a:t>
             </a:fld>
             <a:endParaRPr lang="en-GB"/>
           </a:p>
@@ -1980,7 +1980,7 @@
           <a:p>
             <a:fld id="{6929914E-8A27-4F46-9B95-82C92233D697}" type="datetimeFigureOut">
               <a:rPr lang="en-GB" smtClean="0"/>
-              <a:t>18/03/2014</a:t>
+              <a:t>18/07/2014</a:t>
             </a:fld>
             <a:endParaRPr lang="en-GB"/>
           </a:p>
@@ -2257,7 +2257,7 @@
           <a:p>
             <a:fld id="{6929914E-8A27-4F46-9B95-82C92233D697}" type="datetimeFigureOut">
               <a:rPr lang="en-GB" smtClean="0"/>
-              <a:t>18/03/2014</a:t>
+              <a:t>18/07/2014</a:t>
             </a:fld>
             <a:endParaRPr lang="en-GB"/>
           </a:p>
@@ -2510,7 +2510,7 @@
           <a:p>
             <a:fld id="{6929914E-8A27-4F46-9B95-82C92233D697}" type="datetimeFigureOut">
               <a:rPr lang="en-GB" smtClean="0"/>
-              <a:t>18/03/2014</a:t>
+              <a:t>18/07/2014</a:t>
             </a:fld>
             <a:endParaRPr lang="en-GB"/>
           </a:p>
@@ -2723,7 +2723,7 @@
           <a:p>
             <a:fld id="{6929914E-8A27-4F46-9B95-82C92233D697}" type="datetimeFigureOut">
               <a:rPr lang="en-GB" smtClean="0"/>
-              <a:t>18/03/2014</a:t>
+              <a:t>18/07/2014</a:t>
             </a:fld>
             <a:endParaRPr lang="en-GB"/>
           </a:p>
@@ -3206,7 +3206,7 @@
         </p:spPr>
         <p:txBody>
           <a:bodyPr>
-            <a:normAutofit fontScale="47500" lnSpcReduction="20000"/>
+            <a:normAutofit fontScale="85000" lnSpcReduction="20000"/>
           </a:bodyPr>
           <a:lstStyle/>
           <a:p>
@@ -3317,53 +3317,9 @@
             <a:endParaRPr lang="en-GB" sz="3200" dirty="0"/>
           </a:p>
           <a:p>
-            <a:pPr lvl="2"/>
-            <a:r>
-              <a:rPr lang="en-GB" dirty="0"/>
-              <a:t>View Cloud </a:t>
-            </a:r>
-            <a:r>
-              <a:rPr lang="en-GB" dirty="0" err="1" smtClean="0"/>
-              <a:t>Ruleset</a:t>
-            </a:r>
-            <a:endParaRPr lang="en-GB" dirty="0" smtClean="0"/>
-          </a:p>
-          <a:p>
-            <a:pPr lvl="2"/>
-            <a:r>
-              <a:rPr lang="en-GB" sz="2300" dirty="0" smtClean="0"/>
-              <a:t>Compare Cloud and Local</a:t>
-            </a:r>
-            <a:endParaRPr lang="en-GB" sz="2300" dirty="0"/>
-          </a:p>
-          <a:p>
-            <a:pPr lvl="1"/>
+            <a:pPr lvl="0"/>
             <a:r>
               <a:rPr lang="en-GB" dirty="0" smtClean="0"/>
-              <a:t>Cloud</a:t>
-            </a:r>
-            <a:endParaRPr lang="en-GB" sz="3600" dirty="0"/>
-          </a:p>
-          <a:p>
-            <a:pPr lvl="2"/>
-            <a:r>
-              <a:rPr lang="en-GB" dirty="0"/>
-              <a:t>Push Rules To Cloud</a:t>
-            </a:r>
-            <a:endParaRPr lang="en-GB" sz="3200" dirty="0"/>
-          </a:p>
-          <a:p>
-            <a:pPr lvl="2"/>
-            <a:r>
-              <a:rPr lang="en-GB" dirty="0"/>
-              <a:t>Pull Rules from Cloud</a:t>
-            </a:r>
-            <a:endParaRPr lang="en-GB" sz="3200" dirty="0"/>
-          </a:p>
-          <a:p>
-            <a:pPr lvl="0"/>
-            <a:r>
-              <a:rPr lang="en-GB" dirty="0"/>
               <a:t>Settings</a:t>
             </a:r>
             <a:endParaRPr lang="en-GB" sz="4000" dirty="0"/>
@@ -3386,30 +3342,6 @@
               <a:rPr lang="en-GB" dirty="0" smtClean="0"/>
               <a:t>Preferences</a:t>
             </a:r>
-          </a:p>
-          <a:p>
-            <a:pPr lvl="1"/>
-            <a:r>
-              <a:rPr lang="en-GB" sz="2700" dirty="0" smtClean="0"/>
-              <a:t>Rules</a:t>
-            </a:r>
-          </a:p>
-          <a:p>
-            <a:pPr lvl="2"/>
-            <a:r>
-              <a:rPr lang="en-GB" sz="2300" dirty="0" smtClean="0"/>
-              <a:t>Compare Local and Cloud</a:t>
-            </a:r>
-          </a:p>
-          <a:p>
-            <a:pPr lvl="2"/>
-            <a:r>
-              <a:rPr lang="en-GB" sz="2300" dirty="0" smtClean="0"/>
-              <a:t>Erase Cloud Data</a:t>
-            </a:r>
-          </a:p>
-          <a:p>
-            <a:pPr lvl="2"/>
             <a:endParaRPr lang="en-GB" sz="2300" dirty="0"/>
           </a:p>
           <a:p>
@@ -3427,46 +3359,6 @@
               <a:t>About</a:t>
             </a:r>
             <a:endParaRPr lang="en-GB" sz="3600" dirty="0"/>
-          </a:p>
-          <a:p>
-            <a:pPr lvl="1"/>
-            <a:r>
-              <a:rPr lang="en-GB" dirty="0"/>
-              <a:t>Account</a:t>
-            </a:r>
-            <a:endParaRPr lang="en-GB" sz="3600" dirty="0"/>
-          </a:p>
-          <a:p>
-            <a:pPr lvl="2"/>
-            <a:r>
-              <a:rPr lang="en-GB" dirty="0"/>
-              <a:t>Upgrade License (unless on full)</a:t>
-            </a:r>
-            <a:endParaRPr lang="en-GB" sz="3200" dirty="0"/>
-          </a:p>
-          <a:p>
-            <a:pPr lvl="2"/>
-            <a:r>
-              <a:rPr lang="en-GB" dirty="0"/>
-              <a:t>Edit Account</a:t>
-            </a:r>
-            <a:endParaRPr lang="en-GB" sz="3200" dirty="0"/>
-          </a:p>
-          <a:p>
-            <a:pPr lvl="2"/>
-            <a:r>
-              <a:rPr lang="en-GB" dirty="0" smtClean="0"/>
-              <a:t>Logout from this computer(or </a:t>
-            </a:r>
-            <a:r>
-              <a:rPr lang="en-GB" dirty="0"/>
-              <a:t>Login</a:t>
-            </a:r>
-            <a:r>
-              <a:rPr lang="en-GB" dirty="0" smtClean="0"/>
-              <a:t>)</a:t>
-            </a:r>
-            <a:endParaRPr lang="en-GB" sz="3200" dirty="0"/>
           </a:p>
         </p:txBody>
       </p:sp>
@@ -3531,15 +3423,7 @@
           <a:p>
             <a:r>
               <a:rPr lang="en-GB" sz="3200" dirty="0" smtClean="0"/>
-              <a:t>When a rule is </a:t>
-            </a:r>
-            <a:r>
-              <a:rPr lang="en-GB" sz="3200" dirty="0" smtClean="0"/>
-              <a:t>selected (or device </a:t>
-            </a:r>
-            <a:r>
-              <a:rPr lang="en-GB" sz="3200" dirty="0" smtClean="0"/>
-              <a:t>with backup rules</a:t>
+              <a:t>When a rule is selected (or device with backup rules</a:t>
             </a:r>
             <a:endParaRPr lang="en-GB" sz="3200" dirty="0"/>
           </a:p>
@@ -3761,11 +3645,7 @@
           <a:p>
             <a:r>
               <a:rPr lang="en-GB" dirty="0" smtClean="0"/>
-              <a:t>When a device is </a:t>
-            </a:r>
-            <a:r>
-              <a:rPr lang="en-GB" dirty="0" smtClean="0"/>
-              <a:t>selected (No Backup)</a:t>
+              <a:t>When a device is selected (No Backup)</a:t>
             </a:r>
             <a:endParaRPr lang="en-GB" dirty="0"/>
           </a:p>
@@ -3862,13 +3742,8 @@
             <a:pPr lvl="1"/>
             <a:r>
               <a:rPr lang="en-GB" dirty="0" smtClean="0"/>
-              <a:t>Devic</a:t>
-            </a:r>
-            <a:r>
-              <a:rPr lang="en-GB" dirty="0" smtClean="0"/>
-              <a:t>e Properties</a:t>
-            </a:r>
-            <a:endParaRPr lang="en-GB" dirty="0" smtClean="0"/>
+              <a:t>Device Properties</a:t>
+            </a:r>
           </a:p>
         </p:txBody>
       </p:sp>

</xml_diff>

<commit_message>
Edited list, even though it isnt really used anymore
</commit_message>
<xml_diff>
--- a/Notes/Main Ribbon Structure.pptx
+++ b/Notes/Main Ribbon Structure.pptx
@@ -291,7 +291,7 @@
           <a:p>
             <a:fld id="{6929914E-8A27-4F46-9B95-82C92233D697}" type="datetimeFigureOut">
               <a:rPr lang="en-GB" smtClean="0"/>
-              <a:t>18/07/2014</a:t>
+              <a:t>21/07/2014</a:t>
             </a:fld>
             <a:endParaRPr lang="en-GB"/>
           </a:p>
@@ -461,7 +461,7 @@
           <a:p>
             <a:fld id="{6929914E-8A27-4F46-9B95-82C92233D697}" type="datetimeFigureOut">
               <a:rPr lang="en-GB" smtClean="0"/>
-              <a:t>18/07/2014</a:t>
+              <a:t>21/07/2014</a:t>
             </a:fld>
             <a:endParaRPr lang="en-GB"/>
           </a:p>
@@ -641,7 +641,7 @@
           <a:p>
             <a:fld id="{6929914E-8A27-4F46-9B95-82C92233D697}" type="datetimeFigureOut">
               <a:rPr lang="en-GB" smtClean="0"/>
-              <a:t>18/07/2014</a:t>
+              <a:t>21/07/2014</a:t>
             </a:fld>
             <a:endParaRPr lang="en-GB"/>
           </a:p>
@@ -811,7 +811,7 @@
           <a:p>
             <a:fld id="{6929914E-8A27-4F46-9B95-82C92233D697}" type="datetimeFigureOut">
               <a:rPr lang="en-GB" smtClean="0"/>
-              <a:t>18/07/2014</a:t>
+              <a:t>21/07/2014</a:t>
             </a:fld>
             <a:endParaRPr lang="en-GB"/>
           </a:p>
@@ -1057,7 +1057,7 @@
           <a:p>
             <a:fld id="{6929914E-8A27-4F46-9B95-82C92233D697}" type="datetimeFigureOut">
               <a:rPr lang="en-GB" smtClean="0"/>
-              <a:t>18/07/2014</a:t>
+              <a:t>21/07/2014</a:t>
             </a:fld>
             <a:endParaRPr lang="en-GB"/>
           </a:p>
@@ -1345,7 +1345,7 @@
           <a:p>
             <a:fld id="{6929914E-8A27-4F46-9B95-82C92233D697}" type="datetimeFigureOut">
               <a:rPr lang="en-GB" smtClean="0"/>
-              <a:t>18/07/2014</a:t>
+              <a:t>21/07/2014</a:t>
             </a:fld>
             <a:endParaRPr lang="en-GB"/>
           </a:p>
@@ -1767,7 +1767,7 @@
           <a:p>
             <a:fld id="{6929914E-8A27-4F46-9B95-82C92233D697}" type="datetimeFigureOut">
               <a:rPr lang="en-GB" smtClean="0"/>
-              <a:t>18/07/2014</a:t>
+              <a:t>21/07/2014</a:t>
             </a:fld>
             <a:endParaRPr lang="en-GB"/>
           </a:p>
@@ -1885,7 +1885,7 @@
           <a:p>
             <a:fld id="{6929914E-8A27-4F46-9B95-82C92233D697}" type="datetimeFigureOut">
               <a:rPr lang="en-GB" smtClean="0"/>
-              <a:t>18/07/2014</a:t>
+              <a:t>21/07/2014</a:t>
             </a:fld>
             <a:endParaRPr lang="en-GB"/>
           </a:p>
@@ -1980,7 +1980,7 @@
           <a:p>
             <a:fld id="{6929914E-8A27-4F46-9B95-82C92233D697}" type="datetimeFigureOut">
               <a:rPr lang="en-GB" smtClean="0"/>
-              <a:t>18/07/2014</a:t>
+              <a:t>21/07/2014</a:t>
             </a:fld>
             <a:endParaRPr lang="en-GB"/>
           </a:p>
@@ -2257,7 +2257,7 @@
           <a:p>
             <a:fld id="{6929914E-8A27-4F46-9B95-82C92233D697}" type="datetimeFigureOut">
               <a:rPr lang="en-GB" smtClean="0"/>
-              <a:t>18/07/2014</a:t>
+              <a:t>21/07/2014</a:t>
             </a:fld>
             <a:endParaRPr lang="en-GB"/>
           </a:p>
@@ -2510,7 +2510,7 @@
           <a:p>
             <a:fld id="{6929914E-8A27-4F46-9B95-82C92233D697}" type="datetimeFigureOut">
               <a:rPr lang="en-GB" smtClean="0"/>
-              <a:t>18/07/2014</a:t>
+              <a:t>21/07/2014</a:t>
             </a:fld>
             <a:endParaRPr lang="en-GB"/>
           </a:p>
@@ -2723,7 +2723,7 @@
           <a:p>
             <a:fld id="{6929914E-8A27-4F46-9B95-82C92233D697}" type="datetimeFigureOut">
               <a:rPr lang="en-GB" smtClean="0"/>
-              <a:t>18/07/2014</a:t>
+              <a:t>21/07/2014</a:t>
             </a:fld>
             <a:endParaRPr lang="en-GB"/>
           </a:p>
@@ -3206,7 +3206,7 @@
         </p:spPr>
         <p:txBody>
           <a:bodyPr>
-            <a:normAutofit fontScale="85000" lnSpcReduction="20000"/>
+            <a:normAutofit fontScale="92500" lnSpcReduction="20000"/>
           </a:bodyPr>
           <a:lstStyle/>
           <a:p>
@@ -3237,14 +3237,6 @@
             <a:endParaRPr lang="en-GB" sz="3200" dirty="0"/>
           </a:p>
           <a:p>
-            <a:pPr lvl="2"/>
-            <a:r>
-              <a:rPr lang="en-GB" dirty="0"/>
-              <a:t>Backup Network Locations</a:t>
-            </a:r>
-            <a:endParaRPr lang="en-GB" sz="3200" dirty="0"/>
-          </a:p>
-          <a:p>
             <a:pPr lvl="1"/>
             <a:r>
               <a:rPr lang="en-GB" dirty="0" smtClean="0"/>
@@ -3256,12 +3248,16 @@
             <a:pPr lvl="2"/>
             <a:r>
               <a:rPr lang="en-GB" dirty="0"/>
-              <a:t>Restore Device from Backup</a:t>
-            </a:r>
-            <a:endParaRPr lang="en-GB" sz="3200" dirty="0"/>
-          </a:p>
-          <a:p>
-            <a:pPr lvl="2"/>
+              <a:t>Restore Device </a:t>
+            </a:r>
+            <a:r>
+              <a:rPr lang="en-GB"/>
+              <a:t>from </a:t>
+            </a:r>
+            <a:r>
+              <a:rPr lang="en-GB" smtClean="0"/>
+              <a:t>Backup</a:t>
+            </a:r>
             <a:r>
               <a:rPr lang="en-GB" dirty="0"/>
               <a:t> </a:t>

</xml_diff>